<commit_message>
Added Validator Lifecyle Page
</commit_message>
<xml_diff>
--- a/website/static/img/Prysm_Docs.pptx
+++ b/website/static/img/Prysm_Docs.pptx
@@ -14,10 +14,11 @@
     <p:sldId id="269" r:id="rId8"/>
     <p:sldId id="265" r:id="rId9"/>
     <p:sldId id="266" r:id="rId10"/>
-    <p:sldId id="257" r:id="rId11"/>
-    <p:sldId id="258" r:id="rId12"/>
-    <p:sldId id="259" r:id="rId13"/>
-    <p:sldId id="261" r:id="rId14"/>
+    <p:sldId id="270" r:id="rId11"/>
+    <p:sldId id="257" r:id="rId12"/>
+    <p:sldId id="258" r:id="rId13"/>
+    <p:sldId id="259" r:id="rId14"/>
+    <p:sldId id="261" r:id="rId15"/>
   </p:sldIdLst>
   <p:sldSz cx="12192000" cy="6858000"/>
   <p:notesSz cx="6858000" cy="9144000"/>
@@ -296,7 +297,7 @@
           <a:p>
             <a:fld id="{78ADB5D7-C4E8-44D3-88DB-0B39486893FA}" type="datetimeFigureOut">
               <a:rPr lang="en-AU" smtClean="0"/>
-              <a:t>9/05/2020</a:t>
+              <a:t>14/05/2020</a:t>
             </a:fld>
             <a:endParaRPr lang="en-AU"/>
           </a:p>
@@ -496,7 +497,7 @@
           <a:p>
             <a:fld id="{78ADB5D7-C4E8-44D3-88DB-0B39486893FA}" type="datetimeFigureOut">
               <a:rPr lang="en-AU" smtClean="0"/>
-              <a:t>9/05/2020</a:t>
+              <a:t>14/05/2020</a:t>
             </a:fld>
             <a:endParaRPr lang="en-AU"/>
           </a:p>
@@ -706,7 +707,7 @@
           <a:p>
             <a:fld id="{78ADB5D7-C4E8-44D3-88DB-0B39486893FA}" type="datetimeFigureOut">
               <a:rPr lang="en-AU" smtClean="0"/>
-              <a:t>9/05/2020</a:t>
+              <a:t>14/05/2020</a:t>
             </a:fld>
             <a:endParaRPr lang="en-AU"/>
           </a:p>
@@ -906,7 +907,7 @@
           <a:p>
             <a:fld id="{78ADB5D7-C4E8-44D3-88DB-0B39486893FA}" type="datetimeFigureOut">
               <a:rPr lang="en-AU" smtClean="0"/>
-              <a:t>9/05/2020</a:t>
+              <a:t>14/05/2020</a:t>
             </a:fld>
             <a:endParaRPr lang="en-AU"/>
           </a:p>
@@ -1182,7 +1183,7 @@
           <a:p>
             <a:fld id="{78ADB5D7-C4E8-44D3-88DB-0B39486893FA}" type="datetimeFigureOut">
               <a:rPr lang="en-AU" smtClean="0"/>
-              <a:t>9/05/2020</a:t>
+              <a:t>14/05/2020</a:t>
             </a:fld>
             <a:endParaRPr lang="en-AU"/>
           </a:p>
@@ -1450,7 +1451,7 @@
           <a:p>
             <a:fld id="{78ADB5D7-C4E8-44D3-88DB-0B39486893FA}" type="datetimeFigureOut">
               <a:rPr lang="en-AU" smtClean="0"/>
-              <a:t>9/05/2020</a:t>
+              <a:t>14/05/2020</a:t>
             </a:fld>
             <a:endParaRPr lang="en-AU"/>
           </a:p>
@@ -1865,7 +1866,7 @@
           <a:p>
             <a:fld id="{78ADB5D7-C4E8-44D3-88DB-0B39486893FA}" type="datetimeFigureOut">
               <a:rPr lang="en-AU" smtClean="0"/>
-              <a:t>9/05/2020</a:t>
+              <a:t>14/05/2020</a:t>
             </a:fld>
             <a:endParaRPr lang="en-AU"/>
           </a:p>
@@ -2007,7 +2008,7 @@
           <a:p>
             <a:fld id="{78ADB5D7-C4E8-44D3-88DB-0B39486893FA}" type="datetimeFigureOut">
               <a:rPr lang="en-AU" smtClean="0"/>
-              <a:t>9/05/2020</a:t>
+              <a:t>14/05/2020</a:t>
             </a:fld>
             <a:endParaRPr lang="en-AU"/>
           </a:p>
@@ -2120,7 +2121,7 @@
           <a:p>
             <a:fld id="{78ADB5D7-C4E8-44D3-88DB-0B39486893FA}" type="datetimeFigureOut">
               <a:rPr lang="en-AU" smtClean="0"/>
-              <a:t>9/05/2020</a:t>
+              <a:t>14/05/2020</a:t>
             </a:fld>
             <a:endParaRPr lang="en-AU"/>
           </a:p>
@@ -2433,7 +2434,7 @@
           <a:p>
             <a:fld id="{78ADB5D7-C4E8-44D3-88DB-0B39486893FA}" type="datetimeFigureOut">
               <a:rPr lang="en-AU" smtClean="0"/>
-              <a:t>9/05/2020</a:t>
+              <a:t>14/05/2020</a:t>
             </a:fld>
             <a:endParaRPr lang="en-AU"/>
           </a:p>
@@ -2722,7 +2723,7 @@
           <a:p>
             <a:fld id="{78ADB5D7-C4E8-44D3-88DB-0B39486893FA}" type="datetimeFigureOut">
               <a:rPr lang="en-AU" smtClean="0"/>
-              <a:t>9/05/2020</a:t>
+              <a:t>14/05/2020</a:t>
             </a:fld>
             <a:endParaRPr lang="en-AU"/>
           </a:p>
@@ -2965,7 +2966,7 @@
           <a:p>
             <a:fld id="{78ADB5D7-C4E8-44D3-88DB-0B39486893FA}" type="datetimeFigureOut">
               <a:rPr lang="en-AU" smtClean="0"/>
-              <a:t>9/05/2020</a:t>
+              <a:t>14/05/2020</a:t>
             </a:fld>
             <a:endParaRPr lang="en-AU"/>
           </a:p>
@@ -4719,6 +4720,1558 @@
           <a:chExt cx="0" cy="0"/>
         </a:xfrm>
       </p:grpSpPr>
+      <p:sp>
+        <p:nvSpPr>
+          <p:cNvPr id="70" name="TextBox 69">
+            <a:extLst>
+              <a:ext uri="{FF2B5EF4-FFF2-40B4-BE49-F238E27FC236}">
+                <a16:creationId xmlns:a16="http://schemas.microsoft.com/office/drawing/2014/main" id="{6B9C9DC0-41D5-4EC5-9B0A-7DB91F2C65AC}"/>
+              </a:ext>
+            </a:extLst>
+          </p:cNvPr>
+          <p:cNvSpPr txBox="1"/>
+          <p:nvPr/>
+        </p:nvSpPr>
+        <p:spPr>
+          <a:xfrm>
+            <a:off x="4655219" y="4624759"/>
+            <a:ext cx="3492482" cy="338554"/>
+          </a:xfrm>
+          <a:prstGeom prst="rect">
+            <a:avLst/>
+          </a:prstGeom>
+          <a:noFill/>
+        </p:spPr>
+        <p:txBody>
+          <a:bodyPr wrap="square" rtlCol="0">
+            <a:spAutoFit/>
+          </a:bodyPr>
+          <a:lstStyle/>
+          <a:p>
+            <a:pPr algn="ctr"/>
+            <a:r>
+              <a:rPr lang="en-AU" sz="1600" b="1" dirty="0">
+                <a:latin typeface="Print Clearly" panose="00000400000000000000" pitchFamily="2" charset="0"/>
+              </a:rPr>
+              <a:t>Queue Delay             Varies Widely </a:t>
+            </a:r>
+          </a:p>
+        </p:txBody>
+      </p:sp>
+      <p:sp>
+        <p:nvSpPr>
+          <p:cNvPr id="7" name="Freeform: Shape 6">
+            <a:extLst>
+              <a:ext uri="{FF2B5EF4-FFF2-40B4-BE49-F238E27FC236}">
+                <a16:creationId xmlns:a16="http://schemas.microsoft.com/office/drawing/2014/main" id="{AEF9EDBC-7A40-467C-B29F-C08B1B39D0FA}"/>
+              </a:ext>
+            </a:extLst>
+          </p:cNvPr>
+          <p:cNvSpPr/>
+          <p:nvPr/>
+        </p:nvSpPr>
+        <p:spPr>
+          <a:xfrm>
+            <a:off x="5626419" y="262917"/>
+            <a:ext cx="1399464" cy="839678"/>
+          </a:xfrm>
+          <a:custGeom>
+            <a:avLst/>
+            <a:gdLst>
+              <a:gd name="connsiteX0" fmla="*/ 0 w 2706687"/>
+              <a:gd name="connsiteY0" fmla="*/ 0 h 1624012"/>
+              <a:gd name="connsiteX1" fmla="*/ 2706687 w 2706687"/>
+              <a:gd name="connsiteY1" fmla="*/ 0 h 1624012"/>
+              <a:gd name="connsiteX2" fmla="*/ 2706687 w 2706687"/>
+              <a:gd name="connsiteY2" fmla="*/ 1624012 h 1624012"/>
+              <a:gd name="connsiteX3" fmla="*/ 0 w 2706687"/>
+              <a:gd name="connsiteY3" fmla="*/ 1624012 h 1624012"/>
+              <a:gd name="connsiteX4" fmla="*/ 0 w 2706687"/>
+              <a:gd name="connsiteY4" fmla="*/ 0 h 1624012"/>
+            </a:gdLst>
+            <a:ahLst/>
+            <a:cxnLst>
+              <a:cxn ang="0">
+                <a:pos x="connsiteX0" y="connsiteY0"/>
+              </a:cxn>
+              <a:cxn ang="0">
+                <a:pos x="connsiteX1" y="connsiteY1"/>
+              </a:cxn>
+              <a:cxn ang="0">
+                <a:pos x="connsiteX2" y="connsiteY2"/>
+              </a:cxn>
+              <a:cxn ang="0">
+                <a:pos x="connsiteX3" y="connsiteY3"/>
+              </a:cxn>
+              <a:cxn ang="0">
+                <a:pos x="connsiteX4" y="connsiteY4"/>
+              </a:cxn>
+            </a:cxnLst>
+            <a:rect l="l" t="t" r="r" b="b"/>
+            <a:pathLst>
+              <a:path w="2706687" h="1624012">
+                <a:moveTo>
+                  <a:pt x="0" y="0"/>
+                </a:moveTo>
+                <a:lnTo>
+                  <a:pt x="2706687" y="0"/>
+                </a:lnTo>
+                <a:lnTo>
+                  <a:pt x="2706687" y="1624012"/>
+                </a:lnTo>
+                <a:lnTo>
+                  <a:pt x="0" y="1624012"/>
+                </a:lnTo>
+                <a:lnTo>
+                  <a:pt x="0" y="0"/>
+                </a:lnTo>
+                <a:close/>
+              </a:path>
+            </a:pathLst>
+          </a:custGeom>
+          <a:solidFill>
+            <a:srgbClr val="3B3B3B"/>
+          </a:solidFill>
+        </p:spPr>
+        <p:style>
+          <a:lnRef idx="2">
+            <a:schemeClr val="lt1">
+              <a:hueOff val="0"/>
+              <a:satOff val="0"/>
+              <a:lumOff val="0"/>
+              <a:alphaOff val="0"/>
+            </a:schemeClr>
+          </a:lnRef>
+          <a:fillRef idx="1">
+            <a:schemeClr val="accent1">
+              <a:hueOff val="0"/>
+              <a:satOff val="0"/>
+              <a:lumOff val="0"/>
+              <a:alphaOff val="0"/>
+            </a:schemeClr>
+          </a:fillRef>
+          <a:effectRef idx="0">
+            <a:schemeClr val="accent1">
+              <a:hueOff val="0"/>
+              <a:satOff val="0"/>
+              <a:lumOff val="0"/>
+              <a:alphaOff val="0"/>
+            </a:schemeClr>
+          </a:effectRef>
+          <a:fontRef idx="minor">
+            <a:schemeClr val="lt1"/>
+          </a:fontRef>
+        </p:style>
+        <p:txBody>
+          <a:bodyPr spcFirstLastPara="0" vert="horz" wrap="square" lIns="152400" tIns="152400" rIns="152400" bIns="152400" numCol="1" spcCol="1270" anchor="ctr" anchorCtr="0">
+            <a:noAutofit/>
+          </a:bodyPr>
+          <a:lstStyle/>
+          <a:p>
+            <a:pPr lvl="0" algn="ctr" defTabSz="1778000">
+              <a:lnSpc>
+                <a:spcPct val="90000"/>
+              </a:lnSpc>
+              <a:spcBef>
+                <a:spcPct val="0"/>
+              </a:spcBef>
+              <a:spcAft>
+                <a:spcPct val="35000"/>
+              </a:spcAft>
+            </a:pPr>
+            <a:r>
+              <a:rPr lang="en-AU" sz="2000" b="1" dirty="0">
+                <a:latin typeface="Print Clearly" panose="00000400000000000000" pitchFamily="2" charset="0"/>
+              </a:rPr>
+              <a:t>DEPOSITED</a:t>
+            </a:r>
+            <a:endParaRPr lang="en-AU" sz="2000" b="1" kern="1200" dirty="0">
+              <a:latin typeface="Print Clearly" panose="00000400000000000000" pitchFamily="2" charset="0"/>
+            </a:endParaRPr>
+          </a:p>
+        </p:txBody>
+      </p:sp>
+      <p:sp>
+        <p:nvSpPr>
+          <p:cNvPr id="8" name="Freeform: Shape 7">
+            <a:extLst>
+              <a:ext uri="{FF2B5EF4-FFF2-40B4-BE49-F238E27FC236}">
+                <a16:creationId xmlns:a16="http://schemas.microsoft.com/office/drawing/2014/main" id="{D3581046-C69F-4625-88E5-16B87A078B63}"/>
+              </a:ext>
+            </a:extLst>
+          </p:cNvPr>
+          <p:cNvSpPr/>
+          <p:nvPr/>
+        </p:nvSpPr>
+        <p:spPr>
+          <a:xfrm>
+            <a:off x="5626419" y="1440919"/>
+            <a:ext cx="1399464" cy="839678"/>
+          </a:xfrm>
+          <a:custGeom>
+            <a:avLst/>
+            <a:gdLst>
+              <a:gd name="connsiteX0" fmla="*/ 0 w 2706687"/>
+              <a:gd name="connsiteY0" fmla="*/ 0 h 1624012"/>
+              <a:gd name="connsiteX1" fmla="*/ 2706687 w 2706687"/>
+              <a:gd name="connsiteY1" fmla="*/ 0 h 1624012"/>
+              <a:gd name="connsiteX2" fmla="*/ 2706687 w 2706687"/>
+              <a:gd name="connsiteY2" fmla="*/ 1624012 h 1624012"/>
+              <a:gd name="connsiteX3" fmla="*/ 0 w 2706687"/>
+              <a:gd name="connsiteY3" fmla="*/ 1624012 h 1624012"/>
+              <a:gd name="connsiteX4" fmla="*/ 0 w 2706687"/>
+              <a:gd name="connsiteY4" fmla="*/ 0 h 1624012"/>
+            </a:gdLst>
+            <a:ahLst/>
+            <a:cxnLst>
+              <a:cxn ang="0">
+                <a:pos x="connsiteX0" y="connsiteY0"/>
+              </a:cxn>
+              <a:cxn ang="0">
+                <a:pos x="connsiteX1" y="connsiteY1"/>
+              </a:cxn>
+              <a:cxn ang="0">
+                <a:pos x="connsiteX2" y="connsiteY2"/>
+              </a:cxn>
+              <a:cxn ang="0">
+                <a:pos x="connsiteX3" y="connsiteY3"/>
+              </a:cxn>
+              <a:cxn ang="0">
+                <a:pos x="connsiteX4" y="connsiteY4"/>
+              </a:cxn>
+            </a:cxnLst>
+            <a:rect l="l" t="t" r="r" b="b"/>
+            <a:pathLst>
+              <a:path w="2706687" h="1624012">
+                <a:moveTo>
+                  <a:pt x="0" y="0"/>
+                </a:moveTo>
+                <a:lnTo>
+                  <a:pt x="2706687" y="0"/>
+                </a:lnTo>
+                <a:lnTo>
+                  <a:pt x="2706687" y="1624012"/>
+                </a:lnTo>
+                <a:lnTo>
+                  <a:pt x="0" y="1624012"/>
+                </a:lnTo>
+                <a:lnTo>
+                  <a:pt x="0" y="0"/>
+                </a:lnTo>
+                <a:close/>
+              </a:path>
+            </a:pathLst>
+          </a:custGeom>
+          <a:solidFill>
+            <a:srgbClr val="3B3B3B"/>
+          </a:solidFill>
+        </p:spPr>
+        <p:style>
+          <a:lnRef idx="2">
+            <a:schemeClr val="lt1">
+              <a:hueOff val="0"/>
+              <a:satOff val="0"/>
+              <a:lumOff val="0"/>
+              <a:alphaOff val="0"/>
+            </a:schemeClr>
+          </a:lnRef>
+          <a:fillRef idx="1">
+            <a:schemeClr val="accent1">
+              <a:hueOff val="0"/>
+              <a:satOff val="0"/>
+              <a:lumOff val="0"/>
+              <a:alphaOff val="0"/>
+            </a:schemeClr>
+          </a:fillRef>
+          <a:effectRef idx="0">
+            <a:schemeClr val="accent1">
+              <a:hueOff val="0"/>
+              <a:satOff val="0"/>
+              <a:lumOff val="0"/>
+              <a:alphaOff val="0"/>
+            </a:schemeClr>
+          </a:effectRef>
+          <a:fontRef idx="minor">
+            <a:schemeClr val="lt1"/>
+          </a:fontRef>
+        </p:style>
+        <p:txBody>
+          <a:bodyPr spcFirstLastPara="0" vert="horz" wrap="square" lIns="152400" tIns="152400" rIns="152400" bIns="152400" numCol="1" spcCol="1270" anchor="ctr" anchorCtr="0">
+            <a:noAutofit/>
+          </a:bodyPr>
+          <a:lstStyle/>
+          <a:p>
+            <a:pPr algn="ctr" defTabSz="1778000">
+              <a:lnSpc>
+                <a:spcPct val="90000"/>
+              </a:lnSpc>
+              <a:spcBef>
+                <a:spcPct val="0"/>
+              </a:spcBef>
+              <a:spcAft>
+                <a:spcPct val="35000"/>
+              </a:spcAft>
+            </a:pPr>
+            <a:r>
+              <a:rPr lang="en-AU" sz="2000" b="1" dirty="0">
+                <a:latin typeface="Print Clearly" panose="00000400000000000000" pitchFamily="2" charset="0"/>
+              </a:rPr>
+              <a:t>PENDING</a:t>
+            </a:r>
+          </a:p>
+        </p:txBody>
+      </p:sp>
+      <p:sp>
+        <p:nvSpPr>
+          <p:cNvPr id="9" name="Freeform: Shape 8">
+            <a:extLst>
+              <a:ext uri="{FF2B5EF4-FFF2-40B4-BE49-F238E27FC236}">
+                <a16:creationId xmlns:a16="http://schemas.microsoft.com/office/drawing/2014/main" id="{0CF625E0-7ADE-413C-8966-BB29B7C8302D}"/>
+              </a:ext>
+            </a:extLst>
+          </p:cNvPr>
+          <p:cNvSpPr/>
+          <p:nvPr/>
+        </p:nvSpPr>
+        <p:spPr>
+          <a:xfrm>
+            <a:off x="4540922" y="3792599"/>
+            <a:ext cx="1399464" cy="839678"/>
+          </a:xfrm>
+          <a:custGeom>
+            <a:avLst/>
+            <a:gdLst>
+              <a:gd name="connsiteX0" fmla="*/ 0 w 2706687"/>
+              <a:gd name="connsiteY0" fmla="*/ 0 h 1624012"/>
+              <a:gd name="connsiteX1" fmla="*/ 2706687 w 2706687"/>
+              <a:gd name="connsiteY1" fmla="*/ 0 h 1624012"/>
+              <a:gd name="connsiteX2" fmla="*/ 2706687 w 2706687"/>
+              <a:gd name="connsiteY2" fmla="*/ 1624012 h 1624012"/>
+              <a:gd name="connsiteX3" fmla="*/ 0 w 2706687"/>
+              <a:gd name="connsiteY3" fmla="*/ 1624012 h 1624012"/>
+              <a:gd name="connsiteX4" fmla="*/ 0 w 2706687"/>
+              <a:gd name="connsiteY4" fmla="*/ 0 h 1624012"/>
+            </a:gdLst>
+            <a:ahLst/>
+            <a:cxnLst>
+              <a:cxn ang="0">
+                <a:pos x="connsiteX0" y="connsiteY0"/>
+              </a:cxn>
+              <a:cxn ang="0">
+                <a:pos x="connsiteX1" y="connsiteY1"/>
+              </a:cxn>
+              <a:cxn ang="0">
+                <a:pos x="connsiteX2" y="connsiteY2"/>
+              </a:cxn>
+              <a:cxn ang="0">
+                <a:pos x="connsiteX3" y="connsiteY3"/>
+              </a:cxn>
+              <a:cxn ang="0">
+                <a:pos x="connsiteX4" y="connsiteY4"/>
+              </a:cxn>
+            </a:cxnLst>
+            <a:rect l="l" t="t" r="r" b="b"/>
+            <a:pathLst>
+              <a:path w="2706687" h="1624012">
+                <a:moveTo>
+                  <a:pt x="0" y="0"/>
+                </a:moveTo>
+                <a:lnTo>
+                  <a:pt x="2706687" y="0"/>
+                </a:lnTo>
+                <a:lnTo>
+                  <a:pt x="2706687" y="1624012"/>
+                </a:lnTo>
+                <a:lnTo>
+                  <a:pt x="0" y="1624012"/>
+                </a:lnTo>
+                <a:lnTo>
+                  <a:pt x="0" y="0"/>
+                </a:lnTo>
+                <a:close/>
+              </a:path>
+            </a:pathLst>
+          </a:custGeom>
+          <a:solidFill>
+            <a:srgbClr val="FFE596"/>
+          </a:solidFill>
+        </p:spPr>
+        <p:style>
+          <a:lnRef idx="2">
+            <a:schemeClr val="lt1">
+              <a:hueOff val="0"/>
+              <a:satOff val="0"/>
+              <a:lumOff val="0"/>
+              <a:alphaOff val="0"/>
+            </a:schemeClr>
+          </a:lnRef>
+          <a:fillRef idx="1">
+            <a:schemeClr val="accent1">
+              <a:hueOff val="0"/>
+              <a:satOff val="0"/>
+              <a:lumOff val="0"/>
+              <a:alphaOff val="0"/>
+            </a:schemeClr>
+          </a:fillRef>
+          <a:effectRef idx="0">
+            <a:schemeClr val="accent1">
+              <a:hueOff val="0"/>
+              <a:satOff val="0"/>
+              <a:lumOff val="0"/>
+              <a:alphaOff val="0"/>
+            </a:schemeClr>
+          </a:effectRef>
+          <a:fontRef idx="minor">
+            <a:schemeClr val="lt1"/>
+          </a:fontRef>
+        </p:style>
+        <p:txBody>
+          <a:bodyPr spcFirstLastPara="0" vert="horz" wrap="square" lIns="152400" tIns="152400" rIns="152400" bIns="152400" numCol="1" spcCol="1270" anchor="ctr" anchorCtr="0">
+            <a:noAutofit/>
+          </a:bodyPr>
+          <a:lstStyle/>
+          <a:p>
+            <a:pPr algn="ctr" defTabSz="1778000">
+              <a:lnSpc>
+                <a:spcPct val="90000"/>
+              </a:lnSpc>
+              <a:spcBef>
+                <a:spcPct val="0"/>
+              </a:spcBef>
+              <a:spcAft>
+                <a:spcPct val="35000"/>
+              </a:spcAft>
+            </a:pPr>
+            <a:r>
+              <a:rPr lang="en-AU" sz="2000" b="1" dirty="0">
+                <a:solidFill>
+                  <a:schemeClr val="tx1"/>
+                </a:solidFill>
+                <a:latin typeface="Print Clearly" panose="00000400000000000000" pitchFamily="2" charset="0"/>
+              </a:rPr>
+              <a:t>EXITING</a:t>
+            </a:r>
+          </a:p>
+        </p:txBody>
+      </p:sp>
+      <p:sp>
+        <p:nvSpPr>
+          <p:cNvPr id="10" name="Freeform: Shape 9">
+            <a:extLst>
+              <a:ext uri="{FF2B5EF4-FFF2-40B4-BE49-F238E27FC236}">
+                <a16:creationId xmlns:a16="http://schemas.microsoft.com/office/drawing/2014/main" id="{522308D2-6998-4CA3-8682-299C00B231FE}"/>
+              </a:ext>
+            </a:extLst>
+          </p:cNvPr>
+          <p:cNvSpPr/>
+          <p:nvPr/>
+        </p:nvSpPr>
+        <p:spPr>
+          <a:xfrm>
+            <a:off x="6748237" y="3789270"/>
+            <a:ext cx="1399464" cy="839678"/>
+          </a:xfrm>
+          <a:custGeom>
+            <a:avLst/>
+            <a:gdLst>
+              <a:gd name="connsiteX0" fmla="*/ 0 w 2706687"/>
+              <a:gd name="connsiteY0" fmla="*/ 0 h 1624012"/>
+              <a:gd name="connsiteX1" fmla="*/ 2706687 w 2706687"/>
+              <a:gd name="connsiteY1" fmla="*/ 0 h 1624012"/>
+              <a:gd name="connsiteX2" fmla="*/ 2706687 w 2706687"/>
+              <a:gd name="connsiteY2" fmla="*/ 1624012 h 1624012"/>
+              <a:gd name="connsiteX3" fmla="*/ 0 w 2706687"/>
+              <a:gd name="connsiteY3" fmla="*/ 1624012 h 1624012"/>
+              <a:gd name="connsiteX4" fmla="*/ 0 w 2706687"/>
+              <a:gd name="connsiteY4" fmla="*/ 0 h 1624012"/>
+            </a:gdLst>
+            <a:ahLst/>
+            <a:cxnLst>
+              <a:cxn ang="0">
+                <a:pos x="connsiteX0" y="connsiteY0"/>
+              </a:cxn>
+              <a:cxn ang="0">
+                <a:pos x="connsiteX1" y="connsiteY1"/>
+              </a:cxn>
+              <a:cxn ang="0">
+                <a:pos x="connsiteX2" y="connsiteY2"/>
+              </a:cxn>
+              <a:cxn ang="0">
+                <a:pos x="connsiteX3" y="connsiteY3"/>
+              </a:cxn>
+              <a:cxn ang="0">
+                <a:pos x="connsiteX4" y="connsiteY4"/>
+              </a:cxn>
+            </a:cxnLst>
+            <a:rect l="l" t="t" r="r" b="b"/>
+            <a:pathLst>
+              <a:path w="2706687" h="1624012">
+                <a:moveTo>
+                  <a:pt x="0" y="0"/>
+                </a:moveTo>
+                <a:lnTo>
+                  <a:pt x="2706687" y="0"/>
+                </a:lnTo>
+                <a:lnTo>
+                  <a:pt x="2706687" y="1624012"/>
+                </a:lnTo>
+                <a:lnTo>
+                  <a:pt x="0" y="1624012"/>
+                </a:lnTo>
+                <a:lnTo>
+                  <a:pt x="0" y="0"/>
+                </a:lnTo>
+                <a:close/>
+              </a:path>
+            </a:pathLst>
+          </a:custGeom>
+          <a:solidFill>
+            <a:srgbClr val="FF30A0"/>
+          </a:solidFill>
+        </p:spPr>
+        <p:style>
+          <a:lnRef idx="2">
+            <a:schemeClr val="lt1">
+              <a:hueOff val="0"/>
+              <a:satOff val="0"/>
+              <a:lumOff val="0"/>
+              <a:alphaOff val="0"/>
+            </a:schemeClr>
+          </a:lnRef>
+          <a:fillRef idx="1">
+            <a:schemeClr val="accent1">
+              <a:hueOff val="0"/>
+              <a:satOff val="0"/>
+              <a:lumOff val="0"/>
+              <a:alphaOff val="0"/>
+            </a:schemeClr>
+          </a:fillRef>
+          <a:effectRef idx="0">
+            <a:schemeClr val="accent1">
+              <a:hueOff val="0"/>
+              <a:satOff val="0"/>
+              <a:lumOff val="0"/>
+              <a:alphaOff val="0"/>
+            </a:schemeClr>
+          </a:effectRef>
+          <a:fontRef idx="minor">
+            <a:schemeClr val="lt1"/>
+          </a:fontRef>
+        </p:style>
+        <p:txBody>
+          <a:bodyPr spcFirstLastPara="0" vert="horz" wrap="square" lIns="152400" tIns="152400" rIns="152400" bIns="152400" numCol="1" spcCol="1270" anchor="ctr" anchorCtr="0">
+            <a:noAutofit/>
+          </a:bodyPr>
+          <a:lstStyle/>
+          <a:p>
+            <a:pPr algn="ctr" defTabSz="1778000">
+              <a:lnSpc>
+                <a:spcPct val="90000"/>
+              </a:lnSpc>
+              <a:spcBef>
+                <a:spcPct val="0"/>
+              </a:spcBef>
+              <a:spcAft>
+                <a:spcPct val="35000"/>
+              </a:spcAft>
+            </a:pPr>
+            <a:r>
+              <a:rPr lang="en-AU" sz="2000" b="1" dirty="0">
+                <a:latin typeface="Print Clearly" panose="00000400000000000000" pitchFamily="2" charset="0"/>
+              </a:rPr>
+              <a:t>SLASHING</a:t>
+            </a:r>
+          </a:p>
+        </p:txBody>
+      </p:sp>
+      <p:sp>
+        <p:nvSpPr>
+          <p:cNvPr id="11" name="Freeform: Shape 10">
+            <a:extLst>
+              <a:ext uri="{FF2B5EF4-FFF2-40B4-BE49-F238E27FC236}">
+                <a16:creationId xmlns:a16="http://schemas.microsoft.com/office/drawing/2014/main" id="{3849A8BD-6169-4F49-9F03-E14647E98579}"/>
+              </a:ext>
+            </a:extLst>
+          </p:cNvPr>
+          <p:cNvSpPr/>
+          <p:nvPr/>
+        </p:nvSpPr>
+        <p:spPr>
+          <a:xfrm>
+            <a:off x="5626419" y="4970565"/>
+            <a:ext cx="1399464" cy="839678"/>
+          </a:xfrm>
+          <a:custGeom>
+            <a:avLst/>
+            <a:gdLst>
+              <a:gd name="connsiteX0" fmla="*/ 0 w 2706687"/>
+              <a:gd name="connsiteY0" fmla="*/ 0 h 1624012"/>
+              <a:gd name="connsiteX1" fmla="*/ 2706687 w 2706687"/>
+              <a:gd name="connsiteY1" fmla="*/ 0 h 1624012"/>
+              <a:gd name="connsiteX2" fmla="*/ 2706687 w 2706687"/>
+              <a:gd name="connsiteY2" fmla="*/ 1624012 h 1624012"/>
+              <a:gd name="connsiteX3" fmla="*/ 0 w 2706687"/>
+              <a:gd name="connsiteY3" fmla="*/ 1624012 h 1624012"/>
+              <a:gd name="connsiteX4" fmla="*/ 0 w 2706687"/>
+              <a:gd name="connsiteY4" fmla="*/ 0 h 1624012"/>
+            </a:gdLst>
+            <a:ahLst/>
+            <a:cxnLst>
+              <a:cxn ang="0">
+                <a:pos x="connsiteX0" y="connsiteY0"/>
+              </a:cxn>
+              <a:cxn ang="0">
+                <a:pos x="connsiteX1" y="connsiteY1"/>
+              </a:cxn>
+              <a:cxn ang="0">
+                <a:pos x="connsiteX2" y="connsiteY2"/>
+              </a:cxn>
+              <a:cxn ang="0">
+                <a:pos x="connsiteX3" y="connsiteY3"/>
+              </a:cxn>
+              <a:cxn ang="0">
+                <a:pos x="connsiteX4" y="connsiteY4"/>
+              </a:cxn>
+            </a:cxnLst>
+            <a:rect l="l" t="t" r="r" b="b"/>
+            <a:pathLst>
+              <a:path w="2706687" h="1624012">
+                <a:moveTo>
+                  <a:pt x="0" y="0"/>
+                </a:moveTo>
+                <a:lnTo>
+                  <a:pt x="2706687" y="0"/>
+                </a:lnTo>
+                <a:lnTo>
+                  <a:pt x="2706687" y="1624012"/>
+                </a:lnTo>
+                <a:lnTo>
+                  <a:pt x="0" y="1624012"/>
+                </a:lnTo>
+                <a:lnTo>
+                  <a:pt x="0" y="0"/>
+                </a:lnTo>
+                <a:close/>
+              </a:path>
+            </a:pathLst>
+          </a:custGeom>
+          <a:solidFill>
+            <a:srgbClr val="3B3B3B"/>
+          </a:solidFill>
+        </p:spPr>
+        <p:style>
+          <a:lnRef idx="2">
+            <a:schemeClr val="lt1">
+              <a:hueOff val="0"/>
+              <a:satOff val="0"/>
+              <a:lumOff val="0"/>
+              <a:alphaOff val="0"/>
+            </a:schemeClr>
+          </a:lnRef>
+          <a:fillRef idx="1">
+            <a:schemeClr val="accent1">
+              <a:hueOff val="0"/>
+              <a:satOff val="0"/>
+              <a:lumOff val="0"/>
+              <a:alphaOff val="0"/>
+            </a:schemeClr>
+          </a:fillRef>
+          <a:effectRef idx="0">
+            <a:schemeClr val="accent1">
+              <a:hueOff val="0"/>
+              <a:satOff val="0"/>
+              <a:lumOff val="0"/>
+              <a:alphaOff val="0"/>
+            </a:schemeClr>
+          </a:effectRef>
+          <a:fontRef idx="minor">
+            <a:schemeClr val="lt1"/>
+          </a:fontRef>
+        </p:style>
+        <p:txBody>
+          <a:bodyPr spcFirstLastPara="0" vert="horz" wrap="square" lIns="152400" tIns="152400" rIns="152400" bIns="152400" numCol="1" spcCol="1270" anchor="ctr" anchorCtr="0">
+            <a:noAutofit/>
+          </a:bodyPr>
+          <a:lstStyle/>
+          <a:p>
+            <a:pPr algn="ctr" defTabSz="1778000">
+              <a:lnSpc>
+                <a:spcPct val="90000"/>
+              </a:lnSpc>
+              <a:spcBef>
+                <a:spcPct val="0"/>
+              </a:spcBef>
+              <a:spcAft>
+                <a:spcPct val="35000"/>
+              </a:spcAft>
+            </a:pPr>
+            <a:r>
+              <a:rPr lang="en-AU" sz="2000" b="1" dirty="0">
+                <a:latin typeface="Print Clearly" panose="00000400000000000000" pitchFamily="2" charset="0"/>
+              </a:rPr>
+              <a:t>EXITED</a:t>
+            </a:r>
+          </a:p>
+        </p:txBody>
+      </p:sp>
+      <p:sp>
+        <p:nvSpPr>
+          <p:cNvPr id="12" name="Freeform: Shape 11">
+            <a:extLst>
+              <a:ext uri="{FF2B5EF4-FFF2-40B4-BE49-F238E27FC236}">
+                <a16:creationId xmlns:a16="http://schemas.microsoft.com/office/drawing/2014/main" id="{63ECCD60-EC0C-451B-8E51-F2DC94F25019}"/>
+              </a:ext>
+            </a:extLst>
+          </p:cNvPr>
+          <p:cNvSpPr/>
+          <p:nvPr/>
+        </p:nvSpPr>
+        <p:spPr>
+          <a:xfrm>
+            <a:off x="3842390" y="262917"/>
+            <a:ext cx="1399464" cy="839678"/>
+          </a:xfrm>
+          <a:custGeom>
+            <a:avLst/>
+            <a:gdLst>
+              <a:gd name="connsiteX0" fmla="*/ 0 w 2706687"/>
+              <a:gd name="connsiteY0" fmla="*/ 0 h 1624012"/>
+              <a:gd name="connsiteX1" fmla="*/ 2706687 w 2706687"/>
+              <a:gd name="connsiteY1" fmla="*/ 0 h 1624012"/>
+              <a:gd name="connsiteX2" fmla="*/ 2706687 w 2706687"/>
+              <a:gd name="connsiteY2" fmla="*/ 1624012 h 1624012"/>
+              <a:gd name="connsiteX3" fmla="*/ 0 w 2706687"/>
+              <a:gd name="connsiteY3" fmla="*/ 1624012 h 1624012"/>
+              <a:gd name="connsiteX4" fmla="*/ 0 w 2706687"/>
+              <a:gd name="connsiteY4" fmla="*/ 0 h 1624012"/>
+            </a:gdLst>
+            <a:ahLst/>
+            <a:cxnLst>
+              <a:cxn ang="0">
+                <a:pos x="connsiteX0" y="connsiteY0"/>
+              </a:cxn>
+              <a:cxn ang="0">
+                <a:pos x="connsiteX1" y="connsiteY1"/>
+              </a:cxn>
+              <a:cxn ang="0">
+                <a:pos x="connsiteX2" y="connsiteY2"/>
+              </a:cxn>
+              <a:cxn ang="0">
+                <a:pos x="connsiteX3" y="connsiteY3"/>
+              </a:cxn>
+              <a:cxn ang="0">
+                <a:pos x="connsiteX4" y="connsiteY4"/>
+              </a:cxn>
+            </a:cxnLst>
+            <a:rect l="l" t="t" r="r" b="b"/>
+            <a:pathLst>
+              <a:path w="2706687" h="1624012">
+                <a:moveTo>
+                  <a:pt x="0" y="0"/>
+                </a:moveTo>
+                <a:lnTo>
+                  <a:pt x="2706687" y="0"/>
+                </a:lnTo>
+                <a:lnTo>
+                  <a:pt x="2706687" y="1624012"/>
+                </a:lnTo>
+                <a:lnTo>
+                  <a:pt x="0" y="1624012"/>
+                </a:lnTo>
+                <a:lnTo>
+                  <a:pt x="0" y="0"/>
+                </a:lnTo>
+                <a:close/>
+              </a:path>
+            </a:pathLst>
+          </a:custGeom>
+          <a:solidFill>
+            <a:srgbClr val="3B3B3B"/>
+          </a:solidFill>
+        </p:spPr>
+        <p:style>
+          <a:lnRef idx="2">
+            <a:schemeClr val="lt1">
+              <a:hueOff val="0"/>
+              <a:satOff val="0"/>
+              <a:lumOff val="0"/>
+              <a:alphaOff val="0"/>
+            </a:schemeClr>
+          </a:lnRef>
+          <a:fillRef idx="1">
+            <a:schemeClr val="accent1">
+              <a:hueOff val="0"/>
+              <a:satOff val="0"/>
+              <a:lumOff val="0"/>
+              <a:alphaOff val="0"/>
+            </a:schemeClr>
+          </a:fillRef>
+          <a:effectRef idx="0">
+            <a:schemeClr val="accent1">
+              <a:hueOff val="0"/>
+              <a:satOff val="0"/>
+              <a:lumOff val="0"/>
+              <a:alphaOff val="0"/>
+            </a:schemeClr>
+          </a:effectRef>
+          <a:fontRef idx="minor">
+            <a:schemeClr val="lt1"/>
+          </a:fontRef>
+        </p:style>
+        <p:txBody>
+          <a:bodyPr spcFirstLastPara="0" vert="horz" wrap="square" lIns="152400" tIns="152400" rIns="152400" bIns="152400" numCol="1" spcCol="1270" anchor="ctr" anchorCtr="0">
+            <a:noAutofit/>
+          </a:bodyPr>
+          <a:lstStyle/>
+          <a:p>
+            <a:pPr marL="0" lvl="0" indent="0" algn="ctr" defTabSz="1778000">
+              <a:lnSpc>
+                <a:spcPct val="90000"/>
+              </a:lnSpc>
+              <a:spcBef>
+                <a:spcPct val="0"/>
+              </a:spcBef>
+              <a:spcAft>
+                <a:spcPct val="35000"/>
+              </a:spcAft>
+              <a:buNone/>
+            </a:pPr>
+            <a:r>
+              <a:rPr lang="en-AU" sz="2000" b="1" kern="1200" dirty="0">
+                <a:latin typeface="Print Clearly" panose="00000400000000000000" pitchFamily="2" charset="0"/>
+              </a:rPr>
+              <a:t>UNKNOWN</a:t>
+            </a:r>
+          </a:p>
+        </p:txBody>
+      </p:sp>
+      <p:sp>
+        <p:nvSpPr>
+          <p:cNvPr id="13" name="Freeform: Shape 12">
+            <a:extLst>
+              <a:ext uri="{FF2B5EF4-FFF2-40B4-BE49-F238E27FC236}">
+                <a16:creationId xmlns:a16="http://schemas.microsoft.com/office/drawing/2014/main" id="{D898045E-F877-4DAF-9BBF-5A6E1561AC56}"/>
+              </a:ext>
+            </a:extLst>
+          </p:cNvPr>
+          <p:cNvSpPr/>
+          <p:nvPr/>
+        </p:nvSpPr>
+        <p:spPr>
+          <a:xfrm>
+            <a:off x="5626419" y="2618921"/>
+            <a:ext cx="1399464" cy="839678"/>
+          </a:xfrm>
+          <a:custGeom>
+            <a:avLst/>
+            <a:gdLst>
+              <a:gd name="connsiteX0" fmla="*/ 0 w 2706687"/>
+              <a:gd name="connsiteY0" fmla="*/ 0 h 1624012"/>
+              <a:gd name="connsiteX1" fmla="*/ 2706687 w 2706687"/>
+              <a:gd name="connsiteY1" fmla="*/ 0 h 1624012"/>
+              <a:gd name="connsiteX2" fmla="*/ 2706687 w 2706687"/>
+              <a:gd name="connsiteY2" fmla="*/ 1624012 h 1624012"/>
+              <a:gd name="connsiteX3" fmla="*/ 0 w 2706687"/>
+              <a:gd name="connsiteY3" fmla="*/ 1624012 h 1624012"/>
+              <a:gd name="connsiteX4" fmla="*/ 0 w 2706687"/>
+              <a:gd name="connsiteY4" fmla="*/ 0 h 1624012"/>
+            </a:gdLst>
+            <a:ahLst/>
+            <a:cxnLst>
+              <a:cxn ang="0">
+                <a:pos x="connsiteX0" y="connsiteY0"/>
+              </a:cxn>
+              <a:cxn ang="0">
+                <a:pos x="connsiteX1" y="connsiteY1"/>
+              </a:cxn>
+              <a:cxn ang="0">
+                <a:pos x="connsiteX2" y="connsiteY2"/>
+              </a:cxn>
+              <a:cxn ang="0">
+                <a:pos x="connsiteX3" y="connsiteY3"/>
+              </a:cxn>
+              <a:cxn ang="0">
+                <a:pos x="connsiteX4" y="connsiteY4"/>
+              </a:cxn>
+            </a:cxnLst>
+            <a:rect l="l" t="t" r="r" b="b"/>
+            <a:pathLst>
+              <a:path w="2706687" h="1624012">
+                <a:moveTo>
+                  <a:pt x="0" y="0"/>
+                </a:moveTo>
+                <a:lnTo>
+                  <a:pt x="2706687" y="0"/>
+                </a:lnTo>
+                <a:lnTo>
+                  <a:pt x="2706687" y="1624012"/>
+                </a:lnTo>
+                <a:lnTo>
+                  <a:pt x="0" y="1624012"/>
+                </a:lnTo>
+                <a:lnTo>
+                  <a:pt x="0" y="0"/>
+                </a:lnTo>
+                <a:close/>
+              </a:path>
+            </a:pathLst>
+          </a:custGeom>
+          <a:solidFill>
+            <a:srgbClr val="FFE596"/>
+          </a:solidFill>
+        </p:spPr>
+        <p:style>
+          <a:lnRef idx="2">
+            <a:schemeClr val="lt1">
+              <a:hueOff val="0"/>
+              <a:satOff val="0"/>
+              <a:lumOff val="0"/>
+              <a:alphaOff val="0"/>
+            </a:schemeClr>
+          </a:lnRef>
+          <a:fillRef idx="1">
+            <a:schemeClr val="accent1">
+              <a:hueOff val="0"/>
+              <a:satOff val="0"/>
+              <a:lumOff val="0"/>
+              <a:alphaOff val="0"/>
+            </a:schemeClr>
+          </a:fillRef>
+          <a:effectRef idx="0">
+            <a:schemeClr val="accent1">
+              <a:hueOff val="0"/>
+              <a:satOff val="0"/>
+              <a:lumOff val="0"/>
+              <a:alphaOff val="0"/>
+            </a:schemeClr>
+          </a:effectRef>
+          <a:fontRef idx="minor">
+            <a:schemeClr val="lt1"/>
+          </a:fontRef>
+        </p:style>
+        <p:txBody>
+          <a:bodyPr spcFirstLastPara="0" vert="horz" wrap="square" lIns="152400" tIns="152400" rIns="152400" bIns="152400" numCol="1" spcCol="1270" anchor="ctr" anchorCtr="0">
+            <a:noAutofit/>
+          </a:bodyPr>
+          <a:lstStyle/>
+          <a:p>
+            <a:pPr algn="ctr" defTabSz="1778000">
+              <a:lnSpc>
+                <a:spcPct val="90000"/>
+              </a:lnSpc>
+              <a:spcBef>
+                <a:spcPct val="0"/>
+              </a:spcBef>
+              <a:spcAft>
+                <a:spcPct val="35000"/>
+              </a:spcAft>
+            </a:pPr>
+            <a:r>
+              <a:rPr lang="en-AU" sz="2000" b="1" dirty="0">
+                <a:solidFill>
+                  <a:schemeClr val="tx1"/>
+                </a:solidFill>
+                <a:latin typeface="Print Clearly" panose="00000400000000000000" pitchFamily="2" charset="0"/>
+              </a:rPr>
+              <a:t>ACTIVE</a:t>
+            </a:r>
+          </a:p>
+        </p:txBody>
+      </p:sp>
+      <p:cxnSp>
+        <p:nvCxnSpPr>
+          <p:cNvPr id="21" name="Straight Arrow Connector 20">
+            <a:extLst>
+              <a:ext uri="{FF2B5EF4-FFF2-40B4-BE49-F238E27FC236}">
+                <a16:creationId xmlns:a16="http://schemas.microsoft.com/office/drawing/2014/main" id="{0613AC33-BA8D-429E-A0FD-2B0DC7A08621}"/>
+              </a:ext>
+            </a:extLst>
+          </p:cNvPr>
+          <p:cNvCxnSpPr>
+            <a:cxnSpLocks/>
+          </p:cNvCxnSpPr>
+          <p:nvPr/>
+        </p:nvCxnSpPr>
+        <p:spPr>
+          <a:xfrm>
+            <a:off x="6326151" y="1148693"/>
+            <a:ext cx="0" cy="228600"/>
+          </a:xfrm>
+          <a:prstGeom prst="straightConnector1">
+            <a:avLst/>
+          </a:prstGeom>
+          <a:ln w="31750">
+            <a:tailEnd type="triangle"/>
+          </a:ln>
+        </p:spPr>
+        <p:style>
+          <a:lnRef idx="3">
+            <a:schemeClr val="dk1"/>
+          </a:lnRef>
+          <a:fillRef idx="0">
+            <a:schemeClr val="dk1"/>
+          </a:fillRef>
+          <a:effectRef idx="2">
+            <a:schemeClr val="dk1"/>
+          </a:effectRef>
+          <a:fontRef idx="minor">
+            <a:schemeClr val="tx1"/>
+          </a:fontRef>
+        </p:style>
+      </p:cxnSp>
+      <p:cxnSp>
+        <p:nvCxnSpPr>
+          <p:cNvPr id="25" name="Straight Arrow Connector 24">
+            <a:extLst>
+              <a:ext uri="{FF2B5EF4-FFF2-40B4-BE49-F238E27FC236}">
+                <a16:creationId xmlns:a16="http://schemas.microsoft.com/office/drawing/2014/main" id="{392AC9EB-1685-46F4-B62E-39566871A265}"/>
+              </a:ext>
+            </a:extLst>
+          </p:cNvPr>
+          <p:cNvCxnSpPr>
+            <a:cxnSpLocks/>
+            <a:endCxn id="9" idx="1"/>
+          </p:cNvCxnSpPr>
+          <p:nvPr/>
+        </p:nvCxnSpPr>
+        <p:spPr>
+          <a:xfrm flipH="1">
+            <a:off x="5940386" y="3462924"/>
+            <a:ext cx="358426" cy="329675"/>
+          </a:xfrm>
+          <a:prstGeom prst="straightConnector1">
+            <a:avLst/>
+          </a:prstGeom>
+          <a:ln w="31750">
+            <a:tailEnd type="triangle"/>
+          </a:ln>
+        </p:spPr>
+        <p:style>
+          <a:lnRef idx="3">
+            <a:schemeClr val="dk1"/>
+          </a:lnRef>
+          <a:fillRef idx="0">
+            <a:schemeClr val="dk1"/>
+          </a:fillRef>
+          <a:effectRef idx="2">
+            <a:schemeClr val="dk1"/>
+          </a:effectRef>
+          <a:fontRef idx="minor">
+            <a:schemeClr val="tx1"/>
+          </a:fontRef>
+        </p:style>
+      </p:cxnSp>
+      <p:cxnSp>
+        <p:nvCxnSpPr>
+          <p:cNvPr id="28" name="Straight Arrow Connector 27">
+            <a:extLst>
+              <a:ext uri="{FF2B5EF4-FFF2-40B4-BE49-F238E27FC236}">
+                <a16:creationId xmlns:a16="http://schemas.microsoft.com/office/drawing/2014/main" id="{7F7DE69B-1131-4D0A-9D08-BBECBEDDCB3D}"/>
+              </a:ext>
+            </a:extLst>
+          </p:cNvPr>
+          <p:cNvCxnSpPr>
+            <a:cxnSpLocks/>
+            <a:endCxn id="10" idx="0"/>
+          </p:cNvCxnSpPr>
+          <p:nvPr/>
+        </p:nvCxnSpPr>
+        <p:spPr>
+          <a:xfrm>
+            <a:off x="6355920" y="3459595"/>
+            <a:ext cx="392317" cy="329675"/>
+          </a:xfrm>
+          <a:prstGeom prst="straightConnector1">
+            <a:avLst/>
+          </a:prstGeom>
+          <a:ln w="31750">
+            <a:tailEnd type="triangle"/>
+          </a:ln>
+        </p:spPr>
+        <p:style>
+          <a:lnRef idx="3">
+            <a:schemeClr val="dk1"/>
+          </a:lnRef>
+          <a:fillRef idx="0">
+            <a:schemeClr val="dk1"/>
+          </a:fillRef>
+          <a:effectRef idx="2">
+            <a:schemeClr val="dk1"/>
+          </a:effectRef>
+          <a:fontRef idx="minor">
+            <a:schemeClr val="tx1"/>
+          </a:fontRef>
+        </p:style>
+      </p:cxnSp>
+      <p:sp>
+        <p:nvSpPr>
+          <p:cNvPr id="42" name="TextBox 41">
+            <a:extLst>
+              <a:ext uri="{FF2B5EF4-FFF2-40B4-BE49-F238E27FC236}">
+                <a16:creationId xmlns:a16="http://schemas.microsoft.com/office/drawing/2014/main" id="{2B850BC7-A2A7-44C6-B74E-79E6BA1C4A63}"/>
+              </a:ext>
+            </a:extLst>
+          </p:cNvPr>
+          <p:cNvSpPr txBox="1"/>
+          <p:nvPr/>
+        </p:nvSpPr>
+        <p:spPr>
+          <a:xfrm>
+            <a:off x="4789672" y="5836691"/>
+            <a:ext cx="3040538" cy="584775"/>
+          </a:xfrm>
+          <a:prstGeom prst="rect">
+            <a:avLst/>
+          </a:prstGeom>
+          <a:noFill/>
+        </p:spPr>
+        <p:txBody>
+          <a:bodyPr wrap="square" rtlCol="0">
+            <a:spAutoFit/>
+          </a:bodyPr>
+          <a:lstStyle/>
+          <a:p>
+            <a:pPr algn="ctr"/>
+            <a:r>
+              <a:rPr lang="en-AU" sz="1600" b="1" dirty="0">
+                <a:latin typeface="Print Clearly" panose="00000400000000000000" pitchFamily="2" charset="0"/>
+              </a:rPr>
+              <a:t>~36 Day withdrawal delay if slashed</a:t>
+            </a:r>
+          </a:p>
+          <a:p>
+            <a:pPr algn="ctr"/>
+            <a:r>
+              <a:rPr lang="en-AU" sz="1600" b="1" dirty="0">
+                <a:latin typeface="Print Clearly" panose="00000400000000000000" pitchFamily="2" charset="0"/>
+              </a:rPr>
+              <a:t>~1 Day delay if exiting normally</a:t>
+            </a:r>
+          </a:p>
+        </p:txBody>
+      </p:sp>
+      <p:sp>
+        <p:nvSpPr>
+          <p:cNvPr id="51" name="TextBox 50">
+            <a:extLst>
+              <a:ext uri="{FF2B5EF4-FFF2-40B4-BE49-F238E27FC236}">
+                <a16:creationId xmlns:a16="http://schemas.microsoft.com/office/drawing/2014/main" id="{C58B2B80-4504-47A4-BC18-736935E030CD}"/>
+              </a:ext>
+            </a:extLst>
+          </p:cNvPr>
+          <p:cNvSpPr txBox="1"/>
+          <p:nvPr/>
+        </p:nvSpPr>
+        <p:spPr>
+          <a:xfrm>
+            <a:off x="6344591" y="1093716"/>
+            <a:ext cx="819108" cy="338554"/>
+          </a:xfrm>
+          <a:prstGeom prst="rect">
+            <a:avLst/>
+          </a:prstGeom>
+          <a:noFill/>
+        </p:spPr>
+        <p:txBody>
+          <a:bodyPr wrap="square" rtlCol="0">
+            <a:spAutoFit/>
+          </a:bodyPr>
+          <a:lstStyle/>
+          <a:p>
+            <a:pPr algn="ctr"/>
+            <a:r>
+              <a:rPr lang="en-AU" sz="1600" b="1" dirty="0">
+                <a:latin typeface="Print Clearly" panose="00000400000000000000" pitchFamily="2" charset="0"/>
+              </a:rPr>
+              <a:t>~7.5 Hrs</a:t>
+            </a:r>
+          </a:p>
+        </p:txBody>
+      </p:sp>
+      <p:cxnSp>
+        <p:nvCxnSpPr>
+          <p:cNvPr id="54" name="Straight Arrow Connector 53">
+            <a:extLst>
+              <a:ext uri="{FF2B5EF4-FFF2-40B4-BE49-F238E27FC236}">
+                <a16:creationId xmlns:a16="http://schemas.microsoft.com/office/drawing/2014/main" id="{EE3264F1-6A7B-4CB1-A9B7-5D2DDB48294E}"/>
+              </a:ext>
+            </a:extLst>
+          </p:cNvPr>
+          <p:cNvCxnSpPr>
+            <a:cxnSpLocks/>
+          </p:cNvCxnSpPr>
+          <p:nvPr/>
+        </p:nvCxnSpPr>
+        <p:spPr>
+          <a:xfrm>
+            <a:off x="5274081" y="682755"/>
+            <a:ext cx="352338" cy="1"/>
+          </a:xfrm>
+          <a:prstGeom prst="straightConnector1">
+            <a:avLst/>
+          </a:prstGeom>
+          <a:ln w="31750">
+            <a:tailEnd type="triangle"/>
+          </a:ln>
+        </p:spPr>
+        <p:style>
+          <a:lnRef idx="3">
+            <a:schemeClr val="dk1"/>
+          </a:lnRef>
+          <a:fillRef idx="0">
+            <a:schemeClr val="dk1"/>
+          </a:fillRef>
+          <a:effectRef idx="2">
+            <a:schemeClr val="dk1"/>
+          </a:effectRef>
+          <a:fontRef idx="minor">
+            <a:schemeClr val="tx1"/>
+          </a:fontRef>
+        </p:style>
+      </p:cxnSp>
+      <p:cxnSp>
+        <p:nvCxnSpPr>
+          <p:cNvPr id="56" name="Straight Arrow Connector 55">
+            <a:extLst>
+              <a:ext uri="{FF2B5EF4-FFF2-40B4-BE49-F238E27FC236}">
+                <a16:creationId xmlns:a16="http://schemas.microsoft.com/office/drawing/2014/main" id="{02298293-C27E-4005-9E7A-5ACAD924A486}"/>
+              </a:ext>
+            </a:extLst>
+          </p:cNvPr>
+          <p:cNvCxnSpPr>
+            <a:cxnSpLocks/>
+          </p:cNvCxnSpPr>
+          <p:nvPr/>
+        </p:nvCxnSpPr>
+        <p:spPr>
+          <a:xfrm>
+            <a:off x="6309941" y="2335459"/>
+            <a:ext cx="0" cy="228600"/>
+          </a:xfrm>
+          <a:prstGeom prst="straightConnector1">
+            <a:avLst/>
+          </a:prstGeom>
+          <a:ln w="31750">
+            <a:tailEnd type="triangle"/>
+          </a:ln>
+        </p:spPr>
+        <p:style>
+          <a:lnRef idx="3">
+            <a:schemeClr val="dk1"/>
+          </a:lnRef>
+          <a:fillRef idx="0">
+            <a:schemeClr val="dk1"/>
+          </a:fillRef>
+          <a:effectRef idx="2">
+            <a:schemeClr val="dk1"/>
+          </a:effectRef>
+          <a:fontRef idx="minor">
+            <a:schemeClr val="tx1"/>
+          </a:fontRef>
+        </p:style>
+      </p:cxnSp>
+      <p:sp>
+        <p:nvSpPr>
+          <p:cNvPr id="57" name="TextBox 56">
+            <a:extLst>
+              <a:ext uri="{FF2B5EF4-FFF2-40B4-BE49-F238E27FC236}">
+                <a16:creationId xmlns:a16="http://schemas.microsoft.com/office/drawing/2014/main" id="{F3A99306-8BD7-43FC-BCF7-1A89A33104A6}"/>
+              </a:ext>
+            </a:extLst>
+          </p:cNvPr>
+          <p:cNvSpPr txBox="1"/>
+          <p:nvPr/>
+        </p:nvSpPr>
+        <p:spPr>
+          <a:xfrm>
+            <a:off x="5130465" y="2280482"/>
+            <a:ext cx="2472489" cy="338554"/>
+          </a:xfrm>
+          <a:prstGeom prst="rect">
+            <a:avLst/>
+          </a:prstGeom>
+          <a:noFill/>
+        </p:spPr>
+        <p:txBody>
+          <a:bodyPr wrap="square" rtlCol="0">
+            <a:spAutoFit/>
+          </a:bodyPr>
+          <a:lstStyle/>
+          <a:p>
+            <a:pPr algn="ctr"/>
+            <a:r>
+              <a:rPr lang="en-AU" sz="1600" b="1" dirty="0">
+                <a:latin typeface="Print Clearly" panose="00000400000000000000" pitchFamily="2" charset="0"/>
+              </a:rPr>
+              <a:t>Queue Delay    Varies Widely</a:t>
+            </a:r>
+          </a:p>
+        </p:txBody>
+      </p:sp>
+      <p:cxnSp>
+        <p:nvCxnSpPr>
+          <p:cNvPr id="63" name="Straight Arrow Connector 62">
+            <a:extLst>
+              <a:ext uri="{FF2B5EF4-FFF2-40B4-BE49-F238E27FC236}">
+                <a16:creationId xmlns:a16="http://schemas.microsoft.com/office/drawing/2014/main" id="{0649145A-E3F2-4C5F-A269-C3D1BDEDCC04}"/>
+              </a:ext>
+            </a:extLst>
+          </p:cNvPr>
+          <p:cNvCxnSpPr>
+            <a:cxnSpLocks/>
+          </p:cNvCxnSpPr>
+          <p:nvPr/>
+        </p:nvCxnSpPr>
+        <p:spPr>
+          <a:xfrm>
+            <a:off x="5940386" y="4626542"/>
+            <a:ext cx="358426" cy="342105"/>
+          </a:xfrm>
+          <a:prstGeom prst="straightConnector1">
+            <a:avLst/>
+          </a:prstGeom>
+          <a:ln w="31750">
+            <a:tailEnd type="triangle"/>
+          </a:ln>
+        </p:spPr>
+        <p:style>
+          <a:lnRef idx="3">
+            <a:schemeClr val="dk1"/>
+          </a:lnRef>
+          <a:fillRef idx="0">
+            <a:schemeClr val="dk1"/>
+          </a:fillRef>
+          <a:effectRef idx="2">
+            <a:schemeClr val="dk1"/>
+          </a:effectRef>
+          <a:fontRef idx="minor">
+            <a:schemeClr val="tx1"/>
+          </a:fontRef>
+        </p:style>
+      </p:cxnSp>
+      <p:cxnSp>
+        <p:nvCxnSpPr>
+          <p:cNvPr id="64" name="Straight Arrow Connector 63">
+            <a:extLst>
+              <a:ext uri="{FF2B5EF4-FFF2-40B4-BE49-F238E27FC236}">
+                <a16:creationId xmlns:a16="http://schemas.microsoft.com/office/drawing/2014/main" id="{1301C922-8336-437E-9F36-42F569C2FBF0}"/>
+              </a:ext>
+            </a:extLst>
+          </p:cNvPr>
+          <p:cNvCxnSpPr>
+            <a:cxnSpLocks/>
+          </p:cNvCxnSpPr>
+          <p:nvPr/>
+        </p:nvCxnSpPr>
+        <p:spPr>
+          <a:xfrm flipH="1">
+            <a:off x="6355920" y="4642307"/>
+            <a:ext cx="399615" cy="326340"/>
+          </a:xfrm>
+          <a:prstGeom prst="straightConnector1">
+            <a:avLst/>
+          </a:prstGeom>
+          <a:ln w="31750">
+            <a:headEnd type="triangle"/>
+            <a:tailEnd type="triangle"/>
+          </a:ln>
+        </p:spPr>
+        <p:style>
+          <a:lnRef idx="3">
+            <a:schemeClr val="dk1"/>
+          </a:lnRef>
+          <a:fillRef idx="0">
+            <a:schemeClr val="dk1"/>
+          </a:fillRef>
+          <a:effectRef idx="2">
+            <a:schemeClr val="dk1"/>
+          </a:effectRef>
+          <a:fontRef idx="minor">
+            <a:schemeClr val="tx1"/>
+          </a:fontRef>
+        </p:style>
+      </p:cxnSp>
+      <p:sp>
+        <p:nvSpPr>
+          <p:cNvPr id="65" name="TextBox 64">
+            <a:extLst>
+              <a:ext uri="{FF2B5EF4-FFF2-40B4-BE49-F238E27FC236}">
+                <a16:creationId xmlns:a16="http://schemas.microsoft.com/office/drawing/2014/main" id="{CC829E0A-E156-4229-A78B-7C8D59052194}"/>
+              </a:ext>
+            </a:extLst>
+          </p:cNvPr>
+          <p:cNvSpPr txBox="1"/>
+          <p:nvPr/>
+        </p:nvSpPr>
+        <p:spPr>
+          <a:xfrm>
+            <a:off x="4047624" y="3432603"/>
+            <a:ext cx="1943546" cy="338554"/>
+          </a:xfrm>
+          <a:prstGeom prst="rect">
+            <a:avLst/>
+          </a:prstGeom>
+          <a:noFill/>
+        </p:spPr>
+        <p:txBody>
+          <a:bodyPr wrap="square" rtlCol="0">
+            <a:spAutoFit/>
+          </a:bodyPr>
+          <a:lstStyle/>
+          <a:p>
+            <a:pPr algn="r"/>
+            <a:r>
+              <a:rPr lang="en-AU" sz="1600" b="1" dirty="0">
+                <a:latin typeface="Print Clearly" panose="00000400000000000000" pitchFamily="2" charset="0"/>
+              </a:rPr>
+              <a:t>Minimum 9 Days Active</a:t>
+            </a:r>
+          </a:p>
+        </p:txBody>
+      </p:sp>
+      <p:sp>
+        <p:nvSpPr>
+          <p:cNvPr id="69" name="TextBox 68">
+            <a:extLst>
+              <a:ext uri="{FF2B5EF4-FFF2-40B4-BE49-F238E27FC236}">
+                <a16:creationId xmlns:a16="http://schemas.microsoft.com/office/drawing/2014/main" id="{E925869A-79BD-4F50-9F0F-DA1EFBFAE988}"/>
+              </a:ext>
+            </a:extLst>
+          </p:cNvPr>
+          <p:cNvSpPr txBox="1"/>
+          <p:nvPr/>
+        </p:nvSpPr>
+        <p:spPr>
+          <a:xfrm>
+            <a:off x="6731112" y="3458333"/>
+            <a:ext cx="1357424" cy="338554"/>
+          </a:xfrm>
+          <a:prstGeom prst="rect">
+            <a:avLst/>
+          </a:prstGeom>
+          <a:noFill/>
+        </p:spPr>
+        <p:txBody>
+          <a:bodyPr wrap="square" rtlCol="0">
+            <a:spAutoFit/>
+          </a:bodyPr>
+          <a:lstStyle/>
+          <a:p>
+            <a:r>
+              <a:rPr lang="en-AU" sz="1600" b="1" dirty="0">
+                <a:latin typeface="Print Clearly" panose="00000400000000000000" pitchFamily="2" charset="0"/>
+              </a:rPr>
+              <a:t>No Delay</a:t>
+            </a:r>
+          </a:p>
+        </p:txBody>
+      </p:sp>
+      <p:cxnSp>
+        <p:nvCxnSpPr>
+          <p:cNvPr id="71" name="Straight Arrow Connector 70">
+            <a:extLst>
+              <a:ext uri="{FF2B5EF4-FFF2-40B4-BE49-F238E27FC236}">
+                <a16:creationId xmlns:a16="http://schemas.microsoft.com/office/drawing/2014/main" id="{92F52DA4-1CEC-417C-9589-8ADFDEF454D9}"/>
+              </a:ext>
+            </a:extLst>
+          </p:cNvPr>
+          <p:cNvCxnSpPr>
+            <a:cxnSpLocks/>
+          </p:cNvCxnSpPr>
+          <p:nvPr/>
+        </p:nvCxnSpPr>
+        <p:spPr>
+          <a:xfrm>
+            <a:off x="5957511" y="4203172"/>
+            <a:ext cx="773601" cy="5693"/>
+          </a:xfrm>
+          <a:prstGeom prst="straightConnector1">
+            <a:avLst/>
+          </a:prstGeom>
+          <a:ln w="31750">
+            <a:tailEnd type="triangle"/>
+          </a:ln>
+        </p:spPr>
+        <p:style>
+          <a:lnRef idx="3">
+            <a:schemeClr val="dk1"/>
+          </a:lnRef>
+          <a:fillRef idx="0">
+            <a:schemeClr val="dk1"/>
+          </a:fillRef>
+          <a:effectRef idx="2">
+            <a:schemeClr val="dk1"/>
+          </a:effectRef>
+          <a:fontRef idx="minor">
+            <a:schemeClr val="tx1"/>
+          </a:fontRef>
+        </p:style>
+      </p:cxnSp>
+      <p:sp>
+        <p:nvSpPr>
+          <p:cNvPr id="76" name="TextBox 75">
+            <a:extLst>
+              <a:ext uri="{FF2B5EF4-FFF2-40B4-BE49-F238E27FC236}">
+                <a16:creationId xmlns:a16="http://schemas.microsoft.com/office/drawing/2014/main" id="{FF13A700-009E-45F1-93B9-FF723F5B4F6C}"/>
+              </a:ext>
+            </a:extLst>
+          </p:cNvPr>
+          <p:cNvSpPr txBox="1"/>
+          <p:nvPr/>
+        </p:nvSpPr>
+        <p:spPr>
+          <a:xfrm>
+            <a:off x="53340" y="6399938"/>
+            <a:ext cx="2376155" cy="369332"/>
+          </a:xfrm>
+          <a:prstGeom prst="rect">
+            <a:avLst/>
+          </a:prstGeom>
+          <a:noFill/>
+        </p:spPr>
+        <p:txBody>
+          <a:bodyPr wrap="square" rtlCol="0">
+            <a:spAutoFit/>
+          </a:bodyPr>
+          <a:lstStyle/>
+          <a:p>
+            <a:r>
+              <a:rPr lang="en-AU" dirty="0"/>
+              <a:t>validator-lifecycle.png</a:t>
+            </a:r>
+          </a:p>
+        </p:txBody>
+      </p:sp>
+    </p:spTree>
+    <p:extLst>
+      <p:ext uri="{BB962C8B-B14F-4D97-AF65-F5344CB8AC3E}">
+        <p14:creationId xmlns:p14="http://schemas.microsoft.com/office/powerpoint/2010/main" val="320967604"/>
+      </p:ext>
+    </p:extLst>
+  </p:cSld>
+  <p:clrMapOvr>
+    <a:masterClrMapping/>
+  </p:clrMapOvr>
+</p:sld>
+</file>
+
+<file path=ppt/slides/slide11.xml><?xml version="1.0" encoding="utf-8"?>
+<p:sld xmlns:a="http://schemas.openxmlformats.org/drawingml/2006/main" xmlns:r="http://schemas.openxmlformats.org/officeDocument/2006/relationships" xmlns:p="http://schemas.openxmlformats.org/presentationml/2006/main">
+  <p:cSld>
+    <p:spTree>
+      <p:nvGrpSpPr>
+        <p:cNvPr id="1" name=""/>
+        <p:cNvGrpSpPr/>
+        <p:nvPr/>
+      </p:nvGrpSpPr>
+      <p:grpSpPr>
+        <a:xfrm>
+          <a:off x="0" y="0"/>
+          <a:ext cx="0" cy="0"/>
+          <a:chOff x="0" y="0"/>
+          <a:chExt cx="0" cy="0"/>
+        </a:xfrm>
+      </p:grpSpPr>
       <p:pic>
         <p:nvPicPr>
           <p:cNvPr id="1026" name="Picture 2" descr="Prysm logo">
@@ -5294,7 +6847,7 @@
 </p:sld>
 </file>
 
-<file path=ppt/slides/slide11.xml><?xml version="1.0" encoding="utf-8"?>
+<file path=ppt/slides/slide12.xml><?xml version="1.0" encoding="utf-8"?>
 <p:sld xmlns:a="http://schemas.openxmlformats.org/drawingml/2006/main" xmlns:r="http://schemas.openxmlformats.org/officeDocument/2006/relationships" xmlns:p="http://schemas.openxmlformats.org/presentationml/2006/main">
   <p:cSld>
     <p:spTree>
@@ -5435,7 +6988,7 @@
 </p:sld>
 </file>
 
-<file path=ppt/slides/slide12.xml><?xml version="1.0" encoding="utf-8"?>
+<file path=ppt/slides/slide13.xml><?xml version="1.0" encoding="utf-8"?>
 <p:sld xmlns:a="http://schemas.openxmlformats.org/drawingml/2006/main" xmlns:r="http://schemas.openxmlformats.org/officeDocument/2006/relationships" xmlns:p="http://schemas.openxmlformats.org/presentationml/2006/main">
   <p:cSld>
     <p:spTree>
@@ -6280,7 +7833,7 @@
 </p:sld>
 </file>
 
-<file path=ppt/slides/slide13.xml><?xml version="1.0" encoding="utf-8"?>
+<file path=ppt/slides/slide14.xml><?xml version="1.0" encoding="utf-8"?>
 <p:sld xmlns:a="http://schemas.openxmlformats.org/drawingml/2006/main" xmlns:r="http://schemas.openxmlformats.org/officeDocument/2006/relationships" xmlns:p="http://schemas.openxmlformats.org/presentationml/2006/main">
   <p:cSld>
     <p:spTree>

</xml_diff>